<commit_message>
:pencil:, :books: :camera: phase two updates on pptx
</commit_message>
<xml_diff>
--- a/Proposal Guide/PRESENTATION TEMPLATE.pptx
+++ b/Proposal Guide/PRESENTATION TEMPLATE.pptx
@@ -5,10 +5,10 @@
     <p:sldMasterId id="2147483652" r:id="rId1"/>
   </p:sldMasterIdLst>
   <p:notesMasterIdLst>
-    <p:notesMasterId r:id="rId14"/>
+    <p:notesMasterId r:id="rId13"/>
   </p:notesMasterIdLst>
   <p:handoutMasterIdLst>
-    <p:handoutMasterId r:id="rId15"/>
+    <p:handoutMasterId r:id="rId14"/>
   </p:handoutMasterIdLst>
   <p:sldIdLst>
     <p:sldId id="325" r:id="rId2"/>
@@ -16,13 +16,12 @@
     <p:sldId id="331" r:id="rId4"/>
     <p:sldId id="332" r:id="rId5"/>
     <p:sldId id="333" r:id="rId6"/>
-    <p:sldId id="354" r:id="rId7"/>
-    <p:sldId id="351" r:id="rId8"/>
-    <p:sldId id="352" r:id="rId9"/>
-    <p:sldId id="334" r:id="rId10"/>
-    <p:sldId id="335" r:id="rId11"/>
-    <p:sldId id="353" r:id="rId12"/>
-    <p:sldId id="324" r:id="rId13"/>
+    <p:sldId id="351" r:id="rId7"/>
+    <p:sldId id="352" r:id="rId8"/>
+    <p:sldId id="334" r:id="rId9"/>
+    <p:sldId id="335" r:id="rId10"/>
+    <p:sldId id="353" r:id="rId11"/>
+    <p:sldId id="324" r:id="rId12"/>
   </p:sldIdLst>
   <p:sldSz cx="9144000" cy="6858000" type="screen4x3"/>
   <p:notesSz cx="6858000" cy="9947275"/>
@@ -2438,7 +2437,7 @@
               <a:pPr>
                 <a:defRPr/>
               </a:pPr>
-              <a:t>9</a:t>
+              <a:t>8</a:t>
             </a:fld>
             <a:endParaRPr lang="en-GB"/>
           </a:p>
@@ -7988,13 +7987,7 @@
       </p:grpSpPr>
       <p:sp>
         <p:nvSpPr>
-          <p:cNvPr id="2" name="Text Placeholder 1">
-            <a:extLst>
-              <a:ext uri="{FF2B5EF4-FFF2-40B4-BE49-F238E27FC236}">
-                <a16:creationId xmlns:a16="http://schemas.microsoft.com/office/drawing/2014/main" id="{327FB035-4EC4-45C3-8B2F-AED423F29F13}"/>
-              </a:ext>
-            </a:extLst>
-          </p:cNvPr>
+          <p:cNvPr id="2" name="Text Placeholder 1"/>
           <p:cNvSpPr>
             <a:spLocks noGrp="1"/>
           </p:cNvSpPr>
@@ -8007,122 +8000,7 @@
           <a:bodyPr/>
           <a:lstStyle/>
           <a:p>
-            <a:pPr marL="342900" indent="-342900">
-              <a:buFont typeface="Arial" panose="020B0604020202020204" pitchFamily="34" charset="0"/>
-              <a:buChar char="•"/>
-            </a:pPr>
-            <a:endParaRPr lang="en-US" sz="2200" b="0" dirty="0"/>
-          </a:p>
-        </p:txBody>
-      </p:sp>
-      <p:sp>
-        <p:nvSpPr>
-          <p:cNvPr id="3" name="Footer Placeholder 2">
-            <a:extLst>
-              <a:ext uri="{FF2B5EF4-FFF2-40B4-BE49-F238E27FC236}">
-                <a16:creationId xmlns:a16="http://schemas.microsoft.com/office/drawing/2014/main" id="{5D13DC20-297E-417D-8DFC-DC2FCABB764B}"/>
-              </a:ext>
-            </a:extLst>
-          </p:cNvPr>
-          <p:cNvSpPr>
-            <a:spLocks noGrp="1"/>
-          </p:cNvSpPr>
-          <p:nvPr>
-            <p:ph type="ftr" sz="quarter" idx="10"/>
-          </p:nvPr>
-        </p:nvSpPr>
-        <p:spPr/>
-        <p:txBody>
-          <a:bodyPr/>
-          <a:lstStyle/>
-          <a:p>
-            <a:pPr>
-              <a:defRPr/>
-            </a:pPr>
-            <a:endParaRPr lang="de-DE"/>
-          </a:p>
-          <a:p>
-            <a:pPr>
-              <a:defRPr/>
-            </a:pPr>
-            <a:endParaRPr lang="de-DE"/>
-          </a:p>
-        </p:txBody>
-      </p:sp>
-      <p:sp>
-        <p:nvSpPr>
-          <p:cNvPr id="4" name="Title 3">
-            <a:extLst>
-              <a:ext uri="{FF2B5EF4-FFF2-40B4-BE49-F238E27FC236}">
-                <a16:creationId xmlns:a16="http://schemas.microsoft.com/office/drawing/2014/main" id="{5EDBB8AF-905E-406C-B321-B53DDA2D2878}"/>
-              </a:ext>
-            </a:extLst>
-          </p:cNvPr>
-          <p:cNvSpPr>
-            <a:spLocks noGrp="1"/>
-          </p:cNvSpPr>
-          <p:nvPr>
-            <p:ph type="title"/>
-          </p:nvPr>
-        </p:nvSpPr>
-        <p:spPr/>
-        <p:txBody>
-          <a:bodyPr/>
-          <a:lstStyle/>
-          <a:p>
-            <a:r>
-              <a:rPr lang="en-US" dirty="0"/>
-              <a:t>Expected Results</a:t>
-            </a:r>
-          </a:p>
-        </p:txBody>
-      </p:sp>
-    </p:spTree>
-    <p:extLst>
-      <p:ext uri="{BB962C8B-B14F-4D97-AF65-F5344CB8AC3E}">
-        <p14:creationId xmlns:p14="http://schemas.microsoft.com/office/powerpoint/2010/main" val="136174935"/>
-      </p:ext>
-    </p:extLst>
-  </p:cSld>
-  <p:clrMapOvr>
-    <a:masterClrMapping/>
-  </p:clrMapOvr>
-</p:sld>
-</file>
-
-<file path=ppt/slides/slide11.xml><?xml version="1.0" encoding="utf-8"?>
-<p:sld xmlns:a="http://schemas.openxmlformats.org/drawingml/2006/main" xmlns:r="http://schemas.openxmlformats.org/officeDocument/2006/relationships" xmlns:p="http://schemas.openxmlformats.org/presentationml/2006/main">
-  <p:cSld>
-    <p:spTree>
-      <p:nvGrpSpPr>
-        <p:cNvPr id="1" name=""/>
-        <p:cNvGrpSpPr/>
-        <p:nvPr/>
-      </p:nvGrpSpPr>
-      <p:grpSpPr>
-        <a:xfrm>
-          <a:off x="0" y="0"/>
-          <a:ext cx="0" cy="0"/>
-          <a:chOff x="0" y="0"/>
-          <a:chExt cx="0" cy="0"/>
-        </a:xfrm>
-      </p:grpSpPr>
-      <p:sp>
-        <p:nvSpPr>
-          <p:cNvPr id="2" name="Text Placeholder 1"/>
-          <p:cNvSpPr>
-            <a:spLocks noGrp="1"/>
-          </p:cNvSpPr>
-          <p:nvPr>
-            <p:ph type="body" idx="1"/>
-          </p:nvPr>
-        </p:nvSpPr>
-        <p:spPr/>
-        <p:txBody>
-          <a:bodyPr/>
-          <a:lstStyle/>
-          <a:p>
-            <a:endParaRPr lang="en-US"/>
+            <a:endParaRPr lang="en-US" dirty="0"/>
           </a:p>
         </p:txBody>
       </p:sp>
@@ -8189,7 +8067,7 @@
 </p:sld>
 </file>
 
-<file path=ppt/slides/slide12.xml><?xml version="1.0" encoding="utf-8"?>
+<file path=ppt/slides/slide11.xml><?xml version="1.0" encoding="utf-8"?>
 <p:sld xmlns:a="http://schemas.openxmlformats.org/drawingml/2006/main" xmlns:r="http://schemas.openxmlformats.org/officeDocument/2006/relationships" xmlns:p="http://schemas.openxmlformats.org/presentationml/2006/main">
   <p:cSld>
     <p:spTree>
@@ -9076,13 +8954,8 @@
             </a:pPr>
             <a:r>
               <a:rPr lang="en-GB" sz="2100" b="0" dirty="0"/>
-              <a:t>To develop a system that reports specified geo-tagged data from the </a:t>
-            </a:r>
-            <a:r>
-              <a:rPr lang="en-GB" sz="2100" b="0"/>
-              <a:t>above sensors.</a:t>
-            </a:r>
-            <a:endParaRPr lang="en-GB" sz="2100" b="0" dirty="0"/>
+              <a:t>To develop a system that reports specified geo-tagged data from the above sensors.</a:t>
+            </a:r>
           </a:p>
           <a:p>
             <a:pPr marL="701675" lvl="2" indent="-342900">
@@ -9193,13 +9066,7 @@
       </p:grpSpPr>
       <p:sp>
         <p:nvSpPr>
-          <p:cNvPr id="2" name="Text Placeholder 1">
-            <a:extLst>
-              <a:ext uri="{FF2B5EF4-FFF2-40B4-BE49-F238E27FC236}">
-                <a16:creationId xmlns:a16="http://schemas.microsoft.com/office/drawing/2014/main" id="{D03B5098-74FB-4E01-A3CC-03B9C5A80458}"/>
-              </a:ext>
-            </a:extLst>
-          </p:cNvPr>
+          <p:cNvPr id="2" name="Text Placeholder 1"/>
           <p:cNvSpPr>
             <a:spLocks noGrp="1"/>
           </p:cNvSpPr>
@@ -9212,163 +9079,13 @@
           <a:bodyPr/>
           <a:lstStyle/>
           <a:p>
-            <a:pPr marL="342900" marR="0" lvl="0" indent="-342900" fontAlgn="base">
-              <a:lnSpc>
-                <a:spcPct val="107000"/>
-              </a:lnSpc>
-              <a:spcBef>
-                <a:spcPts val="1000"/>
-              </a:spcBef>
-              <a:spcAft>
-                <a:spcPts val="0"/>
-              </a:spcAft>
-              <a:buFont typeface="+mj-lt"/>
-              <a:buAutoNum type="romanUcPeriod"/>
-            </a:pPr>
-            <a:r>
-              <a:rPr lang="en-GB" sz="2000" dirty="0">
-                <a:solidFill>
-                  <a:srgbClr val="000000"/>
-                </a:solidFill>
-                <a:effectLst/>
-                <a:latin typeface="Verdana" panose="020B0604030504040204" pitchFamily="34" charset="0"/>
-                <a:ea typeface="Times New Roman" panose="02020603050405020304" pitchFamily="18" charset="0"/>
-                <a:cs typeface="Times New Roman" panose="02020603050405020304" pitchFamily="18" charset="0"/>
-              </a:rPr>
-              <a:t>To Predict occurrence of cyanobacterial and Harmful algal blooms in the Selected Lake.</a:t>
-            </a:r>
-            <a:endParaRPr lang="en-US" sz="2000" dirty="0">
-              <a:effectLst/>
-              <a:latin typeface="Calibri" panose="020F0502020204030204" pitchFamily="34" charset="0"/>
-              <a:ea typeface="Calibri" panose="020F0502020204030204" pitchFamily="34" charset="0"/>
-            </a:endParaRPr>
-          </a:p>
-          <a:p>
-            <a:pPr marL="342900" marR="0" lvl="0" indent="-342900" fontAlgn="base">
-              <a:lnSpc>
-                <a:spcPct val="107000"/>
-              </a:lnSpc>
-              <a:spcBef>
-                <a:spcPts val="1000"/>
-              </a:spcBef>
-              <a:spcAft>
-                <a:spcPts val="0"/>
-              </a:spcAft>
-              <a:buFont typeface="+mj-lt"/>
-              <a:buAutoNum type="romanUcPeriod"/>
-            </a:pPr>
-            <a:r>
-              <a:rPr lang="en-GB" sz="2000" dirty="0">
-                <a:solidFill>
-                  <a:srgbClr val="000000"/>
-                </a:solidFill>
-                <a:effectLst/>
-                <a:latin typeface="Verdana" panose="020B0604030504040204" pitchFamily="34" charset="0"/>
-                <a:ea typeface="Times New Roman" panose="02020603050405020304" pitchFamily="18" charset="0"/>
-                <a:cs typeface="Times New Roman" panose="02020603050405020304" pitchFamily="18" charset="0"/>
-              </a:rPr>
-              <a:t>To associate Automated Internet of Things (IoT) </a:t>
-            </a:r>
-            <a:r>
-              <a:rPr lang="en-GB" sz="2000" i="1" dirty="0">
-                <a:solidFill>
-                  <a:srgbClr val="000000"/>
-                </a:solidFill>
-                <a:effectLst/>
-                <a:latin typeface="Verdana" panose="020B0604030504040204" pitchFamily="34" charset="0"/>
-                <a:ea typeface="Times New Roman" panose="02020603050405020304" pitchFamily="18" charset="0"/>
-                <a:cs typeface="Times New Roman" panose="02020603050405020304" pitchFamily="18" charset="0"/>
-              </a:rPr>
-              <a:t>in situ</a:t>
-            </a:r>
-            <a:r>
-              <a:rPr lang="en-GB" sz="2000" dirty="0">
-                <a:solidFill>
-                  <a:srgbClr val="000000"/>
-                </a:solidFill>
-                <a:effectLst/>
-                <a:latin typeface="Verdana" panose="020B0604030504040204" pitchFamily="34" charset="0"/>
-                <a:ea typeface="Times New Roman" panose="02020603050405020304" pitchFamily="18" charset="0"/>
-                <a:cs typeface="Times New Roman" panose="02020603050405020304" pitchFamily="18" charset="0"/>
-              </a:rPr>
-              <a:t> sensors, machine learning Applicable in near real-time to enhance the accuracy and speed for </a:t>
-            </a:r>
-            <a:r>
-              <a:rPr lang="en-GB" sz="2000" i="1" dirty="0">
-                <a:solidFill>
-                  <a:srgbClr val="000000"/>
-                </a:solidFill>
-                <a:effectLst/>
-                <a:latin typeface="Verdana" panose="020B0604030504040204" pitchFamily="34" charset="0"/>
-                <a:ea typeface="Times New Roman" panose="02020603050405020304" pitchFamily="18" charset="0"/>
-                <a:cs typeface="Times New Roman" panose="02020603050405020304" pitchFamily="18" charset="0"/>
-              </a:rPr>
-              <a:t>in situ </a:t>
-            </a:r>
-            <a:r>
-              <a:rPr lang="en-GB" sz="2000" dirty="0">
-                <a:solidFill>
-                  <a:srgbClr val="000000"/>
-                </a:solidFill>
-                <a:effectLst/>
-                <a:latin typeface="Verdana" panose="020B0604030504040204" pitchFamily="34" charset="0"/>
-                <a:ea typeface="Times New Roman" panose="02020603050405020304" pitchFamily="18" charset="0"/>
-                <a:cs typeface="Times New Roman" panose="02020603050405020304" pitchFamily="18" charset="0"/>
-              </a:rPr>
-              <a:t>data analysis.</a:t>
-            </a:r>
-            <a:endParaRPr lang="en-US" sz="2000" dirty="0">
-              <a:effectLst/>
-              <a:latin typeface="Calibri" panose="020F0502020204030204" pitchFamily="34" charset="0"/>
-              <a:ea typeface="Calibri" panose="020F0502020204030204" pitchFamily="34" charset="0"/>
-            </a:endParaRPr>
-          </a:p>
-          <a:p>
-            <a:pPr marL="342900" marR="0" lvl="0" indent="-342900" fontAlgn="base">
-              <a:lnSpc>
-                <a:spcPct val="107000"/>
-              </a:lnSpc>
-              <a:spcBef>
-                <a:spcPts val="1000"/>
-              </a:spcBef>
-              <a:spcAft>
-                <a:spcPts val="0"/>
-              </a:spcAft>
-              <a:buFont typeface="+mj-lt"/>
-              <a:buAutoNum type="romanUcPeriod"/>
-            </a:pPr>
-            <a:r>
-              <a:rPr lang="en-GB" sz="2000" dirty="0">
-                <a:solidFill>
-                  <a:srgbClr val="000000"/>
-                </a:solidFill>
-                <a:effectLst/>
-                <a:latin typeface="Verdana" panose="020B0604030504040204" pitchFamily="34" charset="0"/>
-                <a:ea typeface="Times New Roman" panose="02020603050405020304" pitchFamily="18" charset="0"/>
-                <a:cs typeface="Times New Roman" panose="02020603050405020304" pitchFamily="18" charset="0"/>
-              </a:rPr>
-              <a:t>To develop a reporting system to alert on a short-term foreseen bloom.</a:t>
-            </a:r>
-            <a:endParaRPr lang="en-US" sz="2000" dirty="0">
-              <a:effectLst/>
-              <a:latin typeface="Calibri" panose="020F0502020204030204" pitchFamily="34" charset="0"/>
-              <a:ea typeface="Calibri" panose="020F0502020204030204" pitchFamily="34" charset="0"/>
-            </a:endParaRPr>
-          </a:p>
-          <a:p>
-            <a:endParaRPr lang="en-US" dirty="0"/>
-          </a:p>
-        </p:txBody>
-      </p:sp>
-      <p:sp>
-        <p:nvSpPr>
-          <p:cNvPr id="3" name="Footer Placeholder 2">
-            <a:extLst>
-              <a:ext uri="{FF2B5EF4-FFF2-40B4-BE49-F238E27FC236}">
-                <a16:creationId xmlns:a16="http://schemas.microsoft.com/office/drawing/2014/main" id="{21F8AECA-D342-4215-8DE1-E926DB08CE51}"/>
-              </a:ext>
-            </a:extLst>
-          </p:cNvPr>
+            <a:endParaRPr lang="en-US"/>
+          </a:p>
+        </p:txBody>
+      </p:sp>
+      <p:sp>
+        <p:nvSpPr>
+          <p:cNvPr id="3" name="Footer Placeholder 2"/>
           <p:cNvSpPr>
             <a:spLocks noGrp="1"/>
           </p:cNvSpPr>
@@ -9396,13 +9113,7 @@
       </p:sp>
       <p:sp>
         <p:nvSpPr>
-          <p:cNvPr id="4" name="Title 3">
-            <a:extLst>
-              <a:ext uri="{FF2B5EF4-FFF2-40B4-BE49-F238E27FC236}">
-                <a16:creationId xmlns:a16="http://schemas.microsoft.com/office/drawing/2014/main" id="{58AE78FC-2B2B-45B1-964F-375909FA81A5}"/>
-              </a:ext>
-            </a:extLst>
-          </p:cNvPr>
+          <p:cNvPr id="4" name="Title 3"/>
           <p:cNvSpPr>
             <a:spLocks noGrp="1"/>
           </p:cNvSpPr>
@@ -9415,14 +9126,17 @@
           <a:bodyPr/>
           <a:lstStyle/>
           <a:p>
-            <a:endParaRPr lang="en-US"/>
+            <a:r>
+              <a:rPr lang="en-US" dirty="0"/>
+              <a:t>Study Area</a:t>
+            </a:r>
           </a:p>
         </p:txBody>
       </p:sp>
     </p:spTree>
     <p:extLst>
       <p:ext uri="{BB962C8B-B14F-4D97-AF65-F5344CB8AC3E}">
-        <p14:creationId xmlns:p14="http://schemas.microsoft.com/office/powerpoint/2010/main" val="914733530"/>
+        <p14:creationId xmlns:p14="http://schemas.microsoft.com/office/powerpoint/2010/main" val="1202890703"/>
       </p:ext>
     </p:extLst>
   </p:cSld>
@@ -9464,105 +9178,6 @@
           <a:bodyPr/>
           <a:lstStyle/>
           <a:p>
-            <a:endParaRPr lang="en-US"/>
-          </a:p>
-        </p:txBody>
-      </p:sp>
-      <p:sp>
-        <p:nvSpPr>
-          <p:cNvPr id="3" name="Footer Placeholder 2"/>
-          <p:cNvSpPr>
-            <a:spLocks noGrp="1"/>
-          </p:cNvSpPr>
-          <p:nvPr>
-            <p:ph type="ftr" sz="quarter" idx="10"/>
-          </p:nvPr>
-        </p:nvSpPr>
-        <p:spPr/>
-        <p:txBody>
-          <a:bodyPr/>
-          <a:lstStyle/>
-          <a:p>
-            <a:pPr>
-              <a:defRPr/>
-            </a:pPr>
-            <a:endParaRPr lang="de-DE"/>
-          </a:p>
-          <a:p>
-            <a:pPr>
-              <a:defRPr/>
-            </a:pPr>
-            <a:endParaRPr lang="de-DE"/>
-          </a:p>
-        </p:txBody>
-      </p:sp>
-      <p:sp>
-        <p:nvSpPr>
-          <p:cNvPr id="4" name="Title 3"/>
-          <p:cNvSpPr>
-            <a:spLocks noGrp="1"/>
-          </p:cNvSpPr>
-          <p:nvPr>
-            <p:ph type="title"/>
-          </p:nvPr>
-        </p:nvSpPr>
-        <p:spPr/>
-        <p:txBody>
-          <a:bodyPr/>
-          <a:lstStyle/>
-          <a:p>
-            <a:r>
-              <a:rPr lang="en-US" dirty="0"/>
-              <a:t>Study Area</a:t>
-            </a:r>
-          </a:p>
-        </p:txBody>
-      </p:sp>
-    </p:spTree>
-    <p:extLst>
-      <p:ext uri="{BB962C8B-B14F-4D97-AF65-F5344CB8AC3E}">
-        <p14:creationId xmlns:p14="http://schemas.microsoft.com/office/powerpoint/2010/main" val="1202890703"/>
-      </p:ext>
-    </p:extLst>
-  </p:cSld>
-  <p:clrMapOvr>
-    <a:masterClrMapping/>
-  </p:clrMapOvr>
-</p:sld>
-</file>
-
-<file path=ppt/slides/slide8.xml><?xml version="1.0" encoding="utf-8"?>
-<p:sld xmlns:a="http://schemas.openxmlformats.org/drawingml/2006/main" xmlns:r="http://schemas.openxmlformats.org/officeDocument/2006/relationships" xmlns:p="http://schemas.openxmlformats.org/presentationml/2006/main">
-  <p:cSld>
-    <p:spTree>
-      <p:nvGrpSpPr>
-        <p:cNvPr id="1" name=""/>
-        <p:cNvGrpSpPr/>
-        <p:nvPr/>
-      </p:nvGrpSpPr>
-      <p:grpSpPr>
-        <a:xfrm>
-          <a:off x="0" y="0"/>
-          <a:ext cx="0" cy="0"/>
-          <a:chOff x="0" y="0"/>
-          <a:chExt cx="0" cy="0"/>
-        </a:xfrm>
-      </p:grpSpPr>
-      <p:sp>
-        <p:nvSpPr>
-          <p:cNvPr id="2" name="Text Placeholder 1"/>
-          <p:cNvSpPr>
-            <a:spLocks noGrp="1"/>
-          </p:cNvSpPr>
-          <p:nvPr>
-            <p:ph type="body" idx="1"/>
-          </p:nvPr>
-        </p:nvSpPr>
-        <p:spPr/>
-        <p:txBody>
-          <a:bodyPr/>
-          <a:lstStyle/>
-          <a:p>
             <a:endParaRPr lang="en-US" dirty="0"/>
           </a:p>
         </p:txBody>
@@ -9630,7 +9245,7 @@
 </p:sld>
 </file>
 
-<file path=ppt/slides/slide9.xml><?xml version="1.0" encoding="utf-8"?>
+<file path=ppt/slides/slide8.xml><?xml version="1.0" encoding="utf-8"?>
 <p:sld xmlns:a="http://schemas.openxmlformats.org/drawingml/2006/main" xmlns:r="http://schemas.openxmlformats.org/officeDocument/2006/relationships" xmlns:p="http://schemas.openxmlformats.org/presentationml/2006/main">
   <p:cSld>
     <p:spTree>
@@ -9741,8 +9356,8 @@
         </p:blipFill>
         <p:spPr>
           <a:xfrm>
-            <a:off x="539552" y="1412776"/>
-            <a:ext cx="7757628" cy="4608492"/>
+            <a:off x="250824" y="1412775"/>
+            <a:ext cx="8137599" cy="4608492"/>
           </a:xfrm>
           <a:prstGeom prst="rect">
             <a:avLst/>
@@ -9776,7 +9391,7 @@
         </p:blipFill>
         <p:spPr bwMode="auto">
           <a:xfrm>
-            <a:off x="4716016" y="5606932"/>
+            <a:off x="4427984" y="5528938"/>
             <a:ext cx="955358" cy="828671"/>
           </a:xfrm>
           <a:prstGeom prst="rect">
@@ -9798,6 +9413,392 @@
     <p:extLst>
       <p:ext uri="{BB962C8B-B14F-4D97-AF65-F5344CB8AC3E}">
         <p14:creationId xmlns:p14="http://schemas.microsoft.com/office/powerpoint/2010/main" val="827824677"/>
+      </p:ext>
+    </p:extLst>
+  </p:cSld>
+  <p:clrMapOvr>
+    <a:masterClrMapping/>
+  </p:clrMapOvr>
+</p:sld>
+</file>
+
+<file path=ppt/slides/slide9.xml><?xml version="1.0" encoding="utf-8"?>
+<p:sld xmlns:a="http://schemas.openxmlformats.org/drawingml/2006/main" xmlns:r="http://schemas.openxmlformats.org/officeDocument/2006/relationships" xmlns:p="http://schemas.openxmlformats.org/presentationml/2006/main">
+  <p:cSld>
+    <p:spTree>
+      <p:nvGrpSpPr>
+        <p:cNvPr id="1" name=""/>
+        <p:cNvGrpSpPr/>
+        <p:nvPr/>
+      </p:nvGrpSpPr>
+      <p:grpSpPr>
+        <a:xfrm>
+          <a:off x="0" y="0"/>
+          <a:ext cx="0" cy="0"/>
+          <a:chOff x="0" y="0"/>
+          <a:chExt cx="0" cy="0"/>
+        </a:xfrm>
+      </p:grpSpPr>
+      <p:sp>
+        <p:nvSpPr>
+          <p:cNvPr id="2" name="Text Placeholder 1">
+            <a:extLst>
+              <a:ext uri="{FF2B5EF4-FFF2-40B4-BE49-F238E27FC236}">
+                <a16:creationId xmlns:a16="http://schemas.microsoft.com/office/drawing/2014/main" id="{327FB035-4EC4-45C3-8B2F-AED423F29F13}"/>
+              </a:ext>
+            </a:extLst>
+          </p:cNvPr>
+          <p:cNvSpPr>
+            <a:spLocks noGrp="1"/>
+          </p:cNvSpPr>
+          <p:nvPr>
+            <p:ph type="body" idx="1"/>
+          </p:nvPr>
+        </p:nvSpPr>
+        <p:spPr/>
+        <p:txBody>
+          <a:bodyPr/>
+          <a:lstStyle/>
+          <a:p>
+            <a:pPr marL="514350" marR="0" lvl="0" indent="-514350" fontAlgn="base">
+              <a:lnSpc>
+                <a:spcPct val="107000"/>
+              </a:lnSpc>
+              <a:spcBef>
+                <a:spcPts val="0"/>
+              </a:spcBef>
+              <a:spcAft>
+                <a:spcPts val="0"/>
+              </a:spcAft>
+              <a:buSzPts val="1000"/>
+              <a:buFont typeface="+mj-lt"/>
+              <a:buAutoNum type="romanUcPeriod"/>
+              <a:tabLst>
+                <a:tab pos="457200" algn="l"/>
+              </a:tabLst>
+            </a:pPr>
+            <a:r>
+              <a:rPr lang="en-GB" dirty="0">
+                <a:solidFill>
+                  <a:srgbClr val="000000"/>
+                </a:solidFill>
+                <a:effectLst/>
+                <a:cs typeface="Times New Roman" panose="02020603050405020304" pitchFamily="18" charset="0"/>
+              </a:rPr>
+              <a:t>Chlorophyl-a Geographical Maps associating the occurrence of the Harmful Algal Blooms and Cyanobacteria.</a:t>
+            </a:r>
+          </a:p>
+          <a:p>
+            <a:pPr marL="514350" marR="0" lvl="0" indent="-514350" fontAlgn="base">
+              <a:lnSpc>
+                <a:spcPct val="107000"/>
+              </a:lnSpc>
+              <a:spcBef>
+                <a:spcPts val="0"/>
+              </a:spcBef>
+              <a:spcAft>
+                <a:spcPts val="0"/>
+              </a:spcAft>
+              <a:buSzPts val="1000"/>
+              <a:buFont typeface="+mj-lt"/>
+              <a:buAutoNum type="romanUcPeriod"/>
+              <a:tabLst>
+                <a:tab pos="457200" algn="l"/>
+              </a:tabLst>
+            </a:pPr>
+            <a:endParaRPr lang="en-GB" dirty="0">
+              <a:solidFill>
+                <a:srgbClr val="000000"/>
+              </a:solidFill>
+              <a:effectLst/>
+              <a:cs typeface="Times New Roman" panose="02020603050405020304" pitchFamily="18" charset="0"/>
+            </a:endParaRPr>
+          </a:p>
+          <a:p>
+            <a:pPr marL="514350" marR="0" lvl="0" indent="-514350" fontAlgn="base">
+              <a:lnSpc>
+                <a:spcPct val="107000"/>
+              </a:lnSpc>
+              <a:spcBef>
+                <a:spcPts val="0"/>
+              </a:spcBef>
+              <a:spcAft>
+                <a:spcPts val="0"/>
+              </a:spcAft>
+              <a:buSzPts val="1000"/>
+              <a:buFont typeface="+mj-lt"/>
+              <a:buAutoNum type="romanUcPeriod"/>
+              <a:tabLst>
+                <a:tab pos="457200" algn="l"/>
+              </a:tabLst>
+            </a:pPr>
+            <a:r>
+              <a:rPr lang="en-GB" dirty="0">
+                <a:solidFill>
+                  <a:srgbClr val="000000"/>
+                </a:solidFill>
+                <a:effectLst/>
+                <a:cs typeface="Times New Roman" panose="02020603050405020304" pitchFamily="18" charset="0"/>
+              </a:rPr>
+              <a:t>Automated system that monitors and reports geo-tagged data</a:t>
+            </a:r>
+          </a:p>
+          <a:p>
+            <a:pPr marL="514350" marR="0" lvl="0" indent="-514350" fontAlgn="base">
+              <a:lnSpc>
+                <a:spcPct val="107000"/>
+              </a:lnSpc>
+              <a:spcBef>
+                <a:spcPts val="0"/>
+              </a:spcBef>
+              <a:spcAft>
+                <a:spcPts val="0"/>
+              </a:spcAft>
+              <a:buSzPts val="1000"/>
+              <a:buFont typeface="+mj-lt"/>
+              <a:buAutoNum type="romanUcPeriod"/>
+              <a:tabLst>
+                <a:tab pos="457200" algn="l"/>
+              </a:tabLst>
+            </a:pPr>
+            <a:endParaRPr lang="en-US" dirty="0">
+              <a:solidFill>
+                <a:srgbClr val="000000"/>
+              </a:solidFill>
+              <a:effectLst/>
+            </a:endParaRPr>
+          </a:p>
+          <a:p>
+            <a:pPr marL="514350" marR="0" lvl="0" indent="-514350" fontAlgn="base">
+              <a:lnSpc>
+                <a:spcPct val="107000"/>
+              </a:lnSpc>
+              <a:spcBef>
+                <a:spcPts val="0"/>
+              </a:spcBef>
+              <a:spcAft>
+                <a:spcPts val="0"/>
+              </a:spcAft>
+              <a:buSzPts val="1000"/>
+              <a:buFont typeface="+mj-lt"/>
+              <a:buAutoNum type="romanUcPeriod"/>
+              <a:tabLst>
+                <a:tab pos="457200" algn="l"/>
+              </a:tabLst>
+            </a:pPr>
+            <a:r>
+              <a:rPr lang="en-GB" dirty="0">
+                <a:solidFill>
+                  <a:srgbClr val="000000"/>
+                </a:solidFill>
+                <a:effectLst/>
+                <a:cs typeface="Times New Roman" panose="02020603050405020304" pitchFamily="18" charset="0"/>
+              </a:rPr>
+              <a:t>Reported confirmation alert Text SMS reporting in near-real time the </a:t>
+            </a:r>
+            <a:r>
+              <a:rPr lang="en-GB" i="1" dirty="0">
+                <a:solidFill>
+                  <a:srgbClr val="000000"/>
+                </a:solidFill>
+                <a:effectLst/>
+                <a:cs typeface="Times New Roman" panose="02020603050405020304" pitchFamily="18" charset="0"/>
+              </a:rPr>
+              <a:t>in-situ </a:t>
+            </a:r>
+            <a:r>
+              <a:rPr lang="en-GB" dirty="0">
+                <a:solidFill>
+                  <a:srgbClr val="000000"/>
+                </a:solidFill>
+                <a:effectLst/>
+                <a:cs typeface="Times New Roman" panose="02020603050405020304" pitchFamily="18" charset="0"/>
+              </a:rPr>
+              <a:t>status from the sensors.</a:t>
+            </a:r>
+          </a:p>
+          <a:p>
+            <a:pPr marL="514350" marR="0" lvl="0" indent="-514350" fontAlgn="base">
+              <a:lnSpc>
+                <a:spcPct val="107000"/>
+              </a:lnSpc>
+              <a:spcBef>
+                <a:spcPts val="0"/>
+              </a:spcBef>
+              <a:spcAft>
+                <a:spcPts val="0"/>
+              </a:spcAft>
+              <a:buSzPts val="1000"/>
+              <a:buFont typeface="+mj-lt"/>
+              <a:buAutoNum type="romanUcPeriod"/>
+              <a:tabLst>
+                <a:tab pos="457200" algn="l"/>
+              </a:tabLst>
+            </a:pPr>
+            <a:endParaRPr lang="en-GB" dirty="0">
+              <a:solidFill>
+                <a:srgbClr val="000000"/>
+              </a:solidFill>
+              <a:cs typeface="Times New Roman" panose="02020603050405020304" pitchFamily="18" charset="0"/>
+            </a:endParaRPr>
+          </a:p>
+          <a:p>
+            <a:pPr marL="514350" marR="0" lvl="0" indent="-514350" fontAlgn="base">
+              <a:lnSpc>
+                <a:spcPct val="107000"/>
+              </a:lnSpc>
+              <a:spcBef>
+                <a:spcPts val="0"/>
+              </a:spcBef>
+              <a:spcAft>
+                <a:spcPts val="0"/>
+              </a:spcAft>
+              <a:buSzPts val="1000"/>
+              <a:buFont typeface="+mj-lt"/>
+              <a:buAutoNum type="romanUcPeriod"/>
+              <a:tabLst>
+                <a:tab pos="457200" algn="l"/>
+              </a:tabLst>
+            </a:pPr>
+            <a:r>
+              <a:rPr lang="en-GB" dirty="0">
+                <a:solidFill>
+                  <a:srgbClr val="000000"/>
+                </a:solidFill>
+                <a:effectLst/>
+                <a:cs typeface="Times New Roman" panose="02020603050405020304" pitchFamily="18" charset="0"/>
+              </a:rPr>
+              <a:t>Time Series predictive model on any </a:t>
+            </a:r>
+            <a:r>
+              <a:rPr lang="en-GB">
+                <a:solidFill>
+                  <a:srgbClr val="000000"/>
+                </a:solidFill>
+                <a:effectLst/>
+                <a:cs typeface="Times New Roman" panose="02020603050405020304" pitchFamily="18" charset="0"/>
+              </a:rPr>
+              <a:t>looming bloom.</a:t>
+            </a:r>
+          </a:p>
+          <a:p>
+            <a:pPr marL="514350" marR="0" lvl="0" indent="-514350" fontAlgn="base">
+              <a:lnSpc>
+                <a:spcPct val="107000"/>
+              </a:lnSpc>
+              <a:spcBef>
+                <a:spcPts val="0"/>
+              </a:spcBef>
+              <a:spcAft>
+                <a:spcPts val="0"/>
+              </a:spcAft>
+              <a:buSzPts val="1000"/>
+              <a:buFont typeface="+mj-lt"/>
+              <a:buAutoNum type="romanUcPeriod"/>
+              <a:tabLst>
+                <a:tab pos="457200" algn="l"/>
+              </a:tabLst>
+            </a:pPr>
+            <a:endParaRPr lang="en-US" dirty="0">
+              <a:solidFill>
+                <a:srgbClr val="000000"/>
+              </a:solidFill>
+              <a:effectLst/>
+            </a:endParaRPr>
+          </a:p>
+          <a:p>
+            <a:pPr marL="0" marR="0" lvl="0" indent="0" fontAlgn="base">
+              <a:lnSpc>
+                <a:spcPct val="107000"/>
+              </a:lnSpc>
+              <a:spcBef>
+                <a:spcPts val="0"/>
+              </a:spcBef>
+              <a:spcAft>
+                <a:spcPts val="0"/>
+              </a:spcAft>
+              <a:buSzPts val="1000"/>
+              <a:tabLst>
+                <a:tab pos="457200" algn="l"/>
+              </a:tabLst>
+            </a:pPr>
+            <a:endParaRPr lang="en-US" sz="1800" dirty="0">
+              <a:solidFill>
+                <a:srgbClr val="000000"/>
+              </a:solidFill>
+              <a:effectLst/>
+              <a:latin typeface="Calibri" panose="020F0502020204030204" pitchFamily="34" charset="0"/>
+              <a:ea typeface="Calibri" panose="020F0502020204030204" pitchFamily="34" charset="0"/>
+            </a:endParaRPr>
+          </a:p>
+        </p:txBody>
+      </p:sp>
+      <p:sp>
+        <p:nvSpPr>
+          <p:cNvPr id="3" name="Footer Placeholder 2">
+            <a:extLst>
+              <a:ext uri="{FF2B5EF4-FFF2-40B4-BE49-F238E27FC236}">
+                <a16:creationId xmlns:a16="http://schemas.microsoft.com/office/drawing/2014/main" id="{5D13DC20-297E-417D-8DFC-DC2FCABB764B}"/>
+              </a:ext>
+            </a:extLst>
+          </p:cNvPr>
+          <p:cNvSpPr>
+            <a:spLocks noGrp="1"/>
+          </p:cNvSpPr>
+          <p:nvPr>
+            <p:ph type="ftr" sz="quarter" idx="10"/>
+          </p:nvPr>
+        </p:nvSpPr>
+        <p:spPr/>
+        <p:txBody>
+          <a:bodyPr/>
+          <a:lstStyle/>
+          <a:p>
+            <a:pPr>
+              <a:defRPr/>
+            </a:pPr>
+            <a:endParaRPr lang="de-DE"/>
+          </a:p>
+          <a:p>
+            <a:pPr>
+              <a:defRPr/>
+            </a:pPr>
+            <a:endParaRPr lang="de-DE"/>
+          </a:p>
+        </p:txBody>
+      </p:sp>
+      <p:sp>
+        <p:nvSpPr>
+          <p:cNvPr id="4" name="Title 3">
+            <a:extLst>
+              <a:ext uri="{FF2B5EF4-FFF2-40B4-BE49-F238E27FC236}">
+                <a16:creationId xmlns:a16="http://schemas.microsoft.com/office/drawing/2014/main" id="{5EDBB8AF-905E-406C-B321-B53DDA2D2878}"/>
+              </a:ext>
+            </a:extLst>
+          </p:cNvPr>
+          <p:cNvSpPr>
+            <a:spLocks noGrp="1"/>
+          </p:cNvSpPr>
+          <p:nvPr>
+            <p:ph type="title"/>
+          </p:nvPr>
+        </p:nvSpPr>
+        <p:spPr/>
+        <p:txBody>
+          <a:bodyPr/>
+          <a:lstStyle/>
+          <a:p>
+            <a:r>
+              <a:rPr lang="en-US" dirty="0"/>
+              <a:t>Expected Results</a:t>
+            </a:r>
+          </a:p>
+        </p:txBody>
+      </p:sp>
+    </p:spTree>
+    <p:extLst>
+      <p:ext uri="{BB962C8B-B14F-4D97-AF65-F5344CB8AC3E}">
+        <p14:creationId xmlns:p14="http://schemas.microsoft.com/office/powerpoint/2010/main" val="136174935"/>
       </p:ext>
     </p:extLst>
   </p:cSld>

</xml_diff>

<commit_message>
:pencil:, :books: :camera: phase two updates,closely related article, more notes
</commit_message>
<xml_diff>
--- a/Proposal Guide/PRESENTATION TEMPLATE.pptx
+++ b/Proposal Guide/PRESENTATION TEMPLATE.pptx
@@ -9022,8 +9022,10 @@
             </a:r>
           </a:p>
           <a:p>
-            <a:pPr marL="0" lvl="0" indent="0"/>
-            <a:endParaRPr lang="en-GB" sz="2200" b="0" dirty="0"/>
+            <a:pPr marL="358775" lvl="2" indent="0">
+              <a:buNone/>
+            </a:pPr>
+            <a:endParaRPr lang="en-GB" sz="2100" b="0" dirty="0"/>
           </a:p>
           <a:p>
             <a:pPr marL="701675" lvl="2" indent="-342900">
@@ -9031,8 +9033,40 @@
               <a:buChar char="o"/>
             </a:pPr>
             <a:r>
-              <a:rPr lang="en-GB" sz="2100" b="0"/>
-              <a:t>To </a:t>
+              <a:rPr lang="en-GB" sz="2100" b="0" dirty="0"/>
+              <a:t>To develop automated </a:t>
+            </a:r>
+            <a:r>
+              <a:rPr lang="en-GB" sz="2100" b="0" i="1" dirty="0"/>
+              <a:t>in-situ</a:t>
+            </a:r>
+            <a:r>
+              <a:rPr lang="en-GB" sz="2100" b="0" dirty="0"/>
+              <a:t> </a:t>
+            </a:r>
+            <a:r>
+              <a:rPr lang="en-GB" sz="2100" dirty="0"/>
+              <a:t>I</a:t>
+            </a:r>
+            <a:r>
+              <a:rPr lang="en-GB" sz="2100" b="0" dirty="0"/>
+              <a:t>nternet </a:t>
+            </a:r>
+            <a:r>
+              <a:rPr lang="en-GB" sz="2100" dirty="0"/>
+              <a:t>o</a:t>
+            </a:r>
+            <a:r>
+              <a:rPr lang="en-GB" sz="2100" b="0" dirty="0"/>
+              <a:t>f </a:t>
+            </a:r>
+            <a:r>
+              <a:rPr lang="en-GB" sz="2100" dirty="0"/>
+              <a:t>T</a:t>
+            </a:r>
+            <a:r>
+              <a:rPr lang="en-GB" sz="2100" b="0" dirty="0"/>
+              <a:t>hings(IoT) sensors to monitor the occurrence of the event.</a:t>
             </a:r>
           </a:p>
           <a:p>
@@ -9042,40 +9076,13 @@
             </a:pPr>
             <a:r>
               <a:rPr lang="en-GB" sz="2100" b="0" dirty="0"/>
-              <a:t>To develop automated </a:t>
-            </a:r>
-            <a:r>
-              <a:rPr lang="en-GB" sz="2100" b="0" i="1" dirty="0"/>
-              <a:t>in-situ</a:t>
-            </a:r>
-            <a:r>
-              <a:rPr lang="en-GB" sz="2100" b="0" dirty="0"/>
-              <a:t> </a:t>
-            </a:r>
-            <a:r>
-              <a:rPr lang="en-GB" sz="2100" dirty="0"/>
-              <a:t>I</a:t>
-            </a:r>
-            <a:r>
-              <a:rPr lang="en-GB" sz="2100" b="0" dirty="0"/>
-              <a:t>nternet </a:t>
-            </a:r>
-            <a:r>
-              <a:rPr lang="en-GB" sz="2100" dirty="0"/>
-              <a:t>o</a:t>
-            </a:r>
-            <a:r>
-              <a:rPr lang="en-GB" sz="2100" b="0" dirty="0"/>
-              <a:t>f </a:t>
-            </a:r>
-            <a:r>
-              <a:rPr lang="en-GB" sz="2100" dirty="0"/>
-              <a:t>T</a:t>
-            </a:r>
-            <a:r>
-              <a:rPr lang="en-GB" sz="2100" b="0" dirty="0"/>
-              <a:t>hings(IoT) sensors to monitor and report specified geo-tagged data.</a:t>
-            </a:r>
+              <a:t>To develop a system that reports specified geo-tagged data from the </a:t>
+            </a:r>
+            <a:r>
+              <a:rPr lang="en-GB" sz="2100" b="0"/>
+              <a:t>above sensors.</a:t>
+            </a:r>
+            <a:endParaRPr lang="en-GB" sz="2100" b="0" dirty="0"/>
           </a:p>
           <a:p>
             <a:pPr marL="701675" lvl="2" indent="-342900">
@@ -9084,15 +9091,7 @@
             </a:pPr>
             <a:r>
               <a:rPr lang="en-GB" sz="2100" b="0" dirty="0"/>
-              <a:t>To associate Machine Learning models to predict the occurrence of </a:t>
-            </a:r>
-            <a:r>
-              <a:rPr lang="en-GB" sz="2100" b="0" dirty="0" err="1"/>
-              <a:t>CynoHAB</a:t>
-            </a:r>
-            <a:r>
-              <a:rPr lang="en-GB" sz="2100" b="0" dirty="0"/>
-              <a:t>.</a:t>
+              <a:t>To associate Machine Learning models to predict the occurrence of CynoHAB.</a:t>
             </a:r>
           </a:p>
           <a:p>

</xml_diff>